<commit_message>
WIP : simplify functions for GUI user tab
</commit_message>
<xml_diff>
--- a/GUI_schema.pptx
+++ b/GUI_schema.pptx
@@ -4064,7 +4064,7 @@
         <p:spPr>
           <a:xfrm>
             <a:off x="838200" y="3159269"/>
-            <a:ext cx="7639207" cy="2031325"/>
+            <a:ext cx="7533409" cy="2031325"/>
           </a:xfrm>
           <a:prstGeom prst="rect">
             <a:avLst/>
@@ -4166,7 +4166,7 @@
           <a:p>
             <a:r>
               <a:rPr lang="en-US" dirty="0"/>
-              <a:t>            -&gt; Frame (</a:t>
+              <a:t>            -&gt; Button (</a:t>
             </a:r>
             <a:r>
               <a:rPr lang="en-US" dirty="0" err="1"/>
@@ -4196,7 +4196,7 @@
           <a:p>
             <a:r>
               <a:rPr lang="en-US" dirty="0"/>
-              <a:t>            -&gt; Frame (</a:t>
+              <a:t>            -&gt; Button (</a:t>
             </a:r>
             <a:r>
               <a:rPr lang="en-US" dirty="0" err="1"/>
@@ -4315,7 +4315,7 @@
         <p:spPr>
           <a:xfrm>
             <a:off x="838200" y="1561379"/>
-            <a:ext cx="8552726" cy="923330"/>
+            <a:ext cx="8681351" cy="646331"/>
           </a:xfrm>
           <a:prstGeom prst="rect">
             <a:avLst/>
@@ -4353,29 +4353,15 @@
           <a:p>
             <a:r>
               <a:rPr lang="en-US" dirty="0"/>
-              <a:t>    -&gt; Frame (</a:t>
-            </a:r>
-            <a:r>
-              <a:rPr lang="en-US" dirty="0" err="1"/>
-              <a:t>deletebutton</a:t>
-            </a:r>
-            <a:r>
-              <a:rPr lang="en-US" dirty="0"/>
-              <a:t>) (parent)</a:t>
-            </a:r>
-          </a:p>
-          <a:p>
-            <a:r>
-              <a:rPr lang="en-US" dirty="0"/>
-              <a:t>        -&gt; Button (</a:t>
-            </a:r>
-            <a:r>
-              <a:rPr lang="en-US" dirty="0" err="1"/>
-              <a:t>label_del</a:t>
-            </a:r>
-            <a:r>
-              <a:rPr lang="en-US" dirty="0"/>
-              <a:t>) -&gt; </a:t>
+              <a:t>    -&gt; Button (</a:t>
+            </a:r>
+            <a:r>
+              <a:rPr lang="en-US" dirty="0" err="1"/>
+              <a:t>del_button</a:t>
+            </a:r>
+            <a:r>
+              <a:rPr lang="en-US" dirty="0"/>
+              <a:t>) (parent) -&gt; </a:t>
             </a:r>
             <a:r>
               <a:rPr lang="en-US" dirty="0" err="1"/>
@@ -4383,7 +4369,7 @@
             </a:r>
             <a:r>
               <a:rPr lang="en-US" dirty="0"/>
-              <a:t> (parent, connection, </a:t>
+              <a:t> (connection, </a:t>
             </a:r>
             <a:r>
               <a:rPr lang="en-US" dirty="0" err="1"/>
@@ -4410,8 +4396,8 @@
         </p:nvSpPr>
         <p:spPr>
           <a:xfrm>
-            <a:off x="838200" y="2711307"/>
-            <a:ext cx="8406917" cy="1754326"/>
+            <a:off x="838200" y="2400756"/>
+            <a:ext cx="7674665" cy="1754326"/>
           </a:xfrm>
           <a:prstGeom prst="rect">
             <a:avLst/>
@@ -4435,7 +4421,7 @@
             </a:r>
             <a:r>
               <a:rPr lang="en-US" dirty="0"/>
-              <a:t> (parent, connection, </a:t>
+              <a:t> (connection, </a:t>
             </a:r>
             <a:r>
               <a:rPr lang="en-US" dirty="0" err="1"/>
@@ -4529,7 +4515,7 @@
             </a:r>
             <a:r>
               <a:rPr lang="en-US" dirty="0"/>
-              <a:t> (parent, connection, </a:t>
+              <a:t> (connection, </a:t>
             </a:r>
             <a:r>
               <a:rPr lang="en-US" dirty="0" err="1"/>
@@ -4556,8 +4542,8 @@
         </p:nvSpPr>
         <p:spPr>
           <a:xfrm>
-            <a:off x="838200" y="4775634"/>
-            <a:ext cx="6843605" cy="2031325"/>
+            <a:off x="838200" y="4330336"/>
+            <a:ext cx="6535122" cy="2031325"/>
           </a:xfrm>
           <a:prstGeom prst="rect">
             <a:avLst/>
@@ -4581,7 +4567,7 @@
             </a:r>
             <a:r>
               <a:rPr lang="en-US" dirty="0"/>
-              <a:t> (parent, connection, </a:t>
+              <a:t> (connection, </a:t>
             </a:r>
             <a:r>
               <a:rPr lang="en-US" dirty="0" err="1"/>
@@ -4631,37 +4617,37 @@
             </a:r>
             <a:r>
               <a:rPr lang="en-US" dirty="0"/>
+              <a:t>(connection, </a:t>
+            </a:r>
+            <a:r>
+              <a:rPr lang="en-US" dirty="0" err="1"/>
+              <a:t>table_name</a:t>
+            </a:r>
+            <a:r>
+              <a:rPr lang="en-US" dirty="0"/>
+              <a:t>, </a:t>
+            </a:r>
+            <a:r>
+              <a:rPr lang="en-US" dirty="0" err="1"/>
+              <a:t>id_val</a:t>
+            </a:r>
+            <a:r>
+              <a:rPr lang="en-US" dirty="0"/>
+              <a:t>)</a:t>
+            </a:r>
+          </a:p>
+          <a:p>
+            <a:r>
+              <a:rPr lang="en-US" dirty="0"/>
+              <a:t>              -&gt; </a:t>
+            </a:r>
+            <a:r>
+              <a:rPr lang="en-US" dirty="0" err="1"/>
+              <a:t>update_table</a:t>
+            </a:r>
+            <a:r>
+              <a:rPr lang="en-US" dirty="0"/>
               <a:t>(</a:t>
-            </a:r>
-            <a:r>
-              <a:rPr lang="en-US" dirty="0" err="1"/>
-              <a:t>connectiontable_name</a:t>
-            </a:r>
-            <a:r>
-              <a:rPr lang="en-US" dirty="0"/>
-              <a:t>, </a:t>
-            </a:r>
-            <a:r>
-              <a:rPr lang="en-US" dirty="0" err="1"/>
-              <a:t>id_val</a:t>
-            </a:r>
-            <a:r>
-              <a:rPr lang="en-US" dirty="0"/>
-              <a:t>)</a:t>
-            </a:r>
-          </a:p>
-          <a:p>
-            <a:r>
-              <a:rPr lang="en-US" dirty="0"/>
-              <a:t>              -&gt; </a:t>
-            </a:r>
-            <a:r>
-              <a:rPr lang="en-US" dirty="0" err="1"/>
-              <a:t>update_table</a:t>
-            </a:r>
-            <a:r>
-              <a:rPr lang="en-US" dirty="0"/>
-              <a:t>(parent, </a:t>
             </a:r>
             <a:r>
               <a:rPr lang="en-US" dirty="0" err="1"/>
@@ -4792,7 +4778,7 @@
         <p:spPr>
           <a:xfrm>
             <a:off x="838200" y="1561379"/>
-            <a:ext cx="8451737" cy="923330"/>
+            <a:ext cx="8814721" cy="646331"/>
           </a:xfrm>
           <a:prstGeom prst="rect">
             <a:avLst/>
@@ -4830,29 +4816,15 @@
           <a:p>
             <a:r>
               <a:rPr lang="en-US" dirty="0"/>
-              <a:t>    -&gt; Frame (</a:t>
-            </a:r>
-            <a:r>
-              <a:rPr lang="en-US" dirty="0" err="1"/>
-              <a:t>addbutton</a:t>
-            </a:r>
-            <a:r>
-              <a:rPr lang="en-US" dirty="0"/>
-              <a:t>) (parent)</a:t>
-            </a:r>
-          </a:p>
-          <a:p>
-            <a:r>
-              <a:rPr lang="en-US" dirty="0"/>
-              <a:t>        -&gt; Button (</a:t>
-            </a:r>
-            <a:r>
-              <a:rPr lang="en-US" dirty="0" err="1"/>
-              <a:t>label_add</a:t>
-            </a:r>
-            <a:r>
-              <a:rPr lang="en-US" dirty="0"/>
-              <a:t>) -&gt; </a:t>
+              <a:t>    -&gt; Button (</a:t>
+            </a:r>
+            <a:r>
+              <a:rPr lang="en-US" dirty="0" err="1"/>
+              <a:t>add_button</a:t>
+            </a:r>
+            <a:r>
+              <a:rPr lang="en-US" dirty="0"/>
+              <a:t>) (parent) -&gt; </a:t>
             </a:r>
             <a:r>
               <a:rPr lang="en-US" dirty="0" err="1"/>
@@ -4860,7 +4832,7 @@
             </a:r>
             <a:r>
               <a:rPr lang="en-US" dirty="0"/>
-              <a:t> (parent, connection, </a:t>
+              <a:t> (connection, </a:t>
             </a:r>
             <a:r>
               <a:rPr lang="en-US" dirty="0" err="1"/>
@@ -4887,8 +4859,8 @@
         </p:nvSpPr>
         <p:spPr>
           <a:xfrm>
-            <a:off x="838200" y="2711307"/>
-            <a:ext cx="6471387" cy="1200329"/>
+            <a:off x="838200" y="2344183"/>
+            <a:ext cx="5860963" cy="1200329"/>
           </a:xfrm>
           <a:prstGeom prst="rect">
             <a:avLst/>
@@ -4912,7 +4884,7 @@
             </a:r>
             <a:r>
               <a:rPr lang="en-US" dirty="0"/>
-              <a:t> (parent, connection, </a:t>
+              <a:t> (connection, </a:t>
             </a:r>
             <a:r>
               <a:rPr lang="en-US" dirty="0" err="1"/>
@@ -4959,7 +4931,7 @@
             </a:r>
             <a:r>
               <a:rPr lang="en-US" dirty="0"/>
-              <a:t>(popup, connection, parent, grandparent) </a:t>
+              <a:t>(popup, connection, grandparent) </a:t>
             </a:r>
           </a:p>
         </p:txBody>
@@ -5021,15 +4993,7 @@
             </a:r>
             <a:r>
               <a:rPr lang="en-US" dirty="0"/>
-              <a:t>(parent, connection, grandparent, </a:t>
-            </a:r>
-            <a:r>
-              <a:rPr lang="en-US" dirty="0" err="1"/>
-              <a:t>grandgrandparent</a:t>
-            </a:r>
-            <a:r>
-              <a:rPr lang="en-US" dirty="0"/>
-              <a:t>)</a:t>
+              <a:t>(popup, connection, grandparent)</a:t>
             </a:r>
           </a:p>
         </p:txBody>
@@ -5049,7 +5013,7 @@
         <p:spPr>
           <a:xfrm>
             <a:off x="930564" y="1690688"/>
-            <a:ext cx="5365764" cy="5078313"/>
+            <a:ext cx="5325689" cy="4524315"/>
           </a:xfrm>
           <a:prstGeom prst="rect">
             <a:avLst/>
@@ -5073,13 +5037,17 @@
             </a:r>
             <a:r>
               <a:rPr lang="en-US" dirty="0"/>
-              <a:t> (parent, connection, grandparent, </a:t>
-            </a:r>
-          </a:p>
-          <a:p>
-            <a:r>
-              <a:rPr lang="en-US" dirty="0" err="1"/>
-              <a:t>grandgrandparent</a:t>
+              <a:t> (popup, connection, grandparent)</a:t>
+            </a:r>
+          </a:p>
+          <a:p>
+            <a:r>
+              <a:rPr lang="en-US" dirty="0"/>
+              <a:t>    -&gt; Label (</a:t>
+            </a:r>
+            <a:r>
+              <a:rPr lang="en-US" dirty="0" err="1"/>
+              <a:t>firstname_lab</a:t>
             </a:r>
             <a:r>
               <a:rPr lang="en-US" dirty="0"/>
@@ -5089,11 +5057,47 @@
           <a:p>
             <a:r>
               <a:rPr lang="en-US" dirty="0"/>
+              <a:t>    -&gt; </a:t>
+            </a:r>
+            <a:r>
+              <a:rPr lang="en-US" dirty="0" err="1"/>
+              <a:t>StringVar</a:t>
+            </a:r>
+            <a:r>
+              <a:rPr lang="en-US" dirty="0"/>
+              <a:t> (</a:t>
+            </a:r>
+            <a:r>
+              <a:rPr lang="en-US" dirty="0" err="1"/>
+              <a:t>firstname</a:t>
+            </a:r>
+            <a:r>
+              <a:rPr lang="en-US" dirty="0"/>
+              <a:t>)</a:t>
+            </a:r>
+          </a:p>
+          <a:p>
+            <a:r>
+              <a:rPr lang="en-US" dirty="0"/>
+              <a:t>    -&gt; Entry (</a:t>
+            </a:r>
+            <a:r>
+              <a:rPr lang="en-US" dirty="0" err="1"/>
+              <a:t>firstname_entry</a:t>
+            </a:r>
+            <a:r>
+              <a:rPr lang="en-US" dirty="0"/>
+              <a:t>)</a:t>
+            </a:r>
+          </a:p>
+          <a:p>
+            <a:r>
+              <a:rPr lang="en-US" dirty="0"/>
               <a:t>    -&gt; Label (</a:t>
             </a:r>
             <a:r>
               <a:rPr lang="en-US" dirty="0" err="1"/>
-              <a:t>firstname_lab</a:t>
+              <a:t>lastname_lab</a:t>
             </a:r>
             <a:r>
               <a:rPr lang="en-US" dirty="0"/>
@@ -5115,194 +5119,160 @@
             </a:r>
             <a:r>
               <a:rPr lang="en-US" dirty="0" err="1"/>
+              <a:t>lastname</a:t>
+            </a:r>
+            <a:r>
+              <a:rPr lang="en-US" dirty="0"/>
+              <a:t>)</a:t>
+            </a:r>
+          </a:p>
+          <a:p>
+            <a:r>
+              <a:rPr lang="en-US" dirty="0"/>
+              <a:t>    -&gt; Entry (</a:t>
+            </a:r>
+            <a:r>
+              <a:rPr lang="en-US" dirty="0" err="1"/>
+              <a:t>lastname_entry</a:t>
+            </a:r>
+            <a:r>
+              <a:rPr lang="en-US" dirty="0"/>
+              <a:t>)</a:t>
+            </a:r>
+          </a:p>
+          <a:p>
+            <a:r>
+              <a:rPr lang="en-US" dirty="0"/>
+              <a:t>    -&gt; Label (</a:t>
+            </a:r>
+            <a:r>
+              <a:rPr lang="en-US" dirty="0" err="1"/>
+              <a:t>status_lab</a:t>
+            </a:r>
+            <a:r>
+              <a:rPr lang="en-US" dirty="0"/>
+              <a:t>)</a:t>
+            </a:r>
+          </a:p>
+          <a:p>
+            <a:r>
+              <a:rPr lang="en-US" dirty="0"/>
+              <a:t>    -&gt; </a:t>
+            </a:r>
+            <a:r>
+              <a:rPr lang="en-US" dirty="0" err="1"/>
+              <a:t>StringVar</a:t>
+            </a:r>
+            <a:r>
+              <a:rPr lang="en-US" dirty="0"/>
+              <a:t> (status)</a:t>
+            </a:r>
+          </a:p>
+          <a:p>
+            <a:r>
+              <a:rPr lang="en-US" dirty="0"/>
+              <a:t>    -&gt; </a:t>
+            </a:r>
+            <a:r>
+              <a:rPr lang="en-US" dirty="0" err="1"/>
+              <a:t>ComboBox</a:t>
+            </a:r>
+            <a:r>
+              <a:rPr lang="en-US" dirty="0"/>
+              <a:t> (</a:t>
+            </a:r>
+            <a:r>
+              <a:rPr lang="en-US" dirty="0" err="1"/>
+              <a:t>statuslist</a:t>
+            </a:r>
+            <a:r>
+              <a:rPr lang="en-US" dirty="0"/>
+              <a:t>)</a:t>
+            </a:r>
+          </a:p>
+          <a:p>
+            <a:r>
+              <a:rPr lang="en-US" dirty="0"/>
+              <a:t>    -&gt; Label (</a:t>
+            </a:r>
+            <a:r>
+              <a:rPr lang="en-US" dirty="0" err="1"/>
+              <a:t>laboratory_lab</a:t>
+            </a:r>
+            <a:r>
+              <a:rPr lang="en-US" dirty="0"/>
+              <a:t>)</a:t>
+            </a:r>
+          </a:p>
+          <a:p>
+            <a:r>
+              <a:rPr lang="en-US" dirty="0"/>
+              <a:t>    -&gt; </a:t>
+            </a:r>
+            <a:r>
+              <a:rPr lang="en-US" dirty="0" err="1"/>
+              <a:t>StringVar</a:t>
+            </a:r>
+            <a:r>
+              <a:rPr lang="en-US" dirty="0"/>
+              <a:t> (laboratory)</a:t>
+            </a:r>
+          </a:p>
+          <a:p>
+            <a:r>
+              <a:rPr lang="en-US" dirty="0"/>
+              <a:t>    -&gt; </a:t>
+            </a:r>
+            <a:r>
+              <a:rPr lang="en-US" dirty="0" err="1"/>
+              <a:t>ComboBox</a:t>
+            </a:r>
+            <a:r>
+              <a:rPr lang="en-US" dirty="0"/>
+              <a:t> (</a:t>
+            </a:r>
+            <a:r>
+              <a:rPr lang="en-US" dirty="0" err="1"/>
+              <a:t>laboratorylist</a:t>
+            </a:r>
+            <a:r>
+              <a:rPr lang="en-US" dirty="0"/>
+              <a:t>)</a:t>
+            </a:r>
+          </a:p>
+          <a:p>
+            <a:r>
+              <a:rPr lang="en-US" dirty="0"/>
+              <a:t>    -&gt; Button (</a:t>
+            </a:r>
+            <a:r>
+              <a:rPr lang="en-US" dirty="0" err="1"/>
+              <a:t>add_user_button</a:t>
+            </a:r>
+            <a:r>
+              <a:rPr lang="en-US" dirty="0"/>
+              <a:t>) -&gt; </a:t>
+            </a:r>
+          </a:p>
+          <a:p>
+            <a:r>
+              <a:rPr lang="en-US" dirty="0"/>
+              <a:t>	</a:t>
+            </a:r>
+            <a:r>
+              <a:rPr lang="en-US" dirty="0" err="1"/>
+              <a:t>add_user_col</a:t>
+            </a:r>
+            <a:r>
+              <a:rPr lang="en-US" dirty="0"/>
+              <a:t>(popup, </a:t>
+            </a:r>
+            <a:r>
+              <a:rPr lang="en-US" dirty="0" err="1"/>
               <a:t>firstname</a:t>
             </a:r>
             <a:r>
               <a:rPr lang="en-US" dirty="0"/>
-              <a:t>)</a:t>
-            </a:r>
-          </a:p>
-          <a:p>
-            <a:r>
-              <a:rPr lang="en-US" dirty="0"/>
-              <a:t>    -&gt; Entry (</a:t>
-            </a:r>
-            <a:r>
-              <a:rPr lang="en-US" dirty="0" err="1"/>
-              <a:t>firstname_entry</a:t>
-            </a:r>
-            <a:r>
-              <a:rPr lang="en-US" dirty="0"/>
-              <a:t>)</a:t>
-            </a:r>
-          </a:p>
-          <a:p>
-            <a:r>
-              <a:rPr lang="en-US" dirty="0"/>
-              <a:t>    -&gt; Label (</a:t>
-            </a:r>
-            <a:r>
-              <a:rPr lang="en-US" dirty="0" err="1"/>
-              <a:t>lastname_lab</a:t>
-            </a:r>
-            <a:r>
-              <a:rPr lang="en-US" dirty="0"/>
-              <a:t>)</a:t>
-            </a:r>
-          </a:p>
-          <a:p>
-            <a:r>
-              <a:rPr lang="en-US" dirty="0"/>
-              <a:t>    -&gt; </a:t>
-            </a:r>
-            <a:r>
-              <a:rPr lang="en-US" dirty="0" err="1"/>
-              <a:t>StringVar</a:t>
-            </a:r>
-            <a:r>
-              <a:rPr lang="en-US" dirty="0"/>
-              <a:t> (</a:t>
-            </a:r>
-            <a:r>
-              <a:rPr lang="en-US" dirty="0" err="1"/>
-              <a:t>lastname</a:t>
-            </a:r>
-            <a:r>
-              <a:rPr lang="en-US" dirty="0"/>
-              <a:t>)</a:t>
-            </a:r>
-          </a:p>
-          <a:p>
-            <a:r>
-              <a:rPr lang="en-US" dirty="0"/>
-              <a:t>    -&gt; Entry (</a:t>
-            </a:r>
-            <a:r>
-              <a:rPr lang="en-US" dirty="0" err="1"/>
-              <a:t>lastname_entry</a:t>
-            </a:r>
-            <a:r>
-              <a:rPr lang="en-US" dirty="0"/>
-              <a:t>)</a:t>
-            </a:r>
-          </a:p>
-          <a:p>
-            <a:r>
-              <a:rPr lang="en-US" dirty="0"/>
-              <a:t>    -&gt; Label (</a:t>
-            </a:r>
-            <a:r>
-              <a:rPr lang="en-US" dirty="0" err="1"/>
-              <a:t>status_lab</a:t>
-            </a:r>
-            <a:r>
-              <a:rPr lang="en-US" dirty="0"/>
-              <a:t>)</a:t>
-            </a:r>
-          </a:p>
-          <a:p>
-            <a:r>
-              <a:rPr lang="en-US" dirty="0"/>
-              <a:t>    -&gt; </a:t>
-            </a:r>
-            <a:r>
-              <a:rPr lang="en-US" dirty="0" err="1"/>
-              <a:t>StringVar</a:t>
-            </a:r>
-            <a:r>
-              <a:rPr lang="en-US" dirty="0"/>
-              <a:t> (status)</a:t>
-            </a:r>
-          </a:p>
-          <a:p>
-            <a:r>
-              <a:rPr lang="en-US" dirty="0"/>
-              <a:t>    -&gt; List (</a:t>
-            </a:r>
-            <a:r>
-              <a:rPr lang="en-US" dirty="0" err="1"/>
-              <a:t>statuslist</a:t>
-            </a:r>
-            <a:r>
-              <a:rPr lang="en-US" dirty="0"/>
-              <a:t>)</a:t>
-            </a:r>
-          </a:p>
-          <a:p>
-            <a:r>
-              <a:rPr lang="en-US" dirty="0"/>
-              <a:t>    -&gt; Label (</a:t>
-            </a:r>
-            <a:r>
-              <a:rPr lang="en-US" dirty="0" err="1"/>
-              <a:t>laboratory_lab</a:t>
-            </a:r>
-            <a:r>
-              <a:rPr lang="en-US" dirty="0"/>
-              <a:t>)</a:t>
-            </a:r>
-          </a:p>
-          <a:p>
-            <a:r>
-              <a:rPr lang="en-US" dirty="0"/>
-              <a:t>    -&gt; </a:t>
-            </a:r>
-            <a:r>
-              <a:rPr lang="en-US" dirty="0" err="1"/>
-              <a:t>StringVar</a:t>
-            </a:r>
-            <a:r>
-              <a:rPr lang="en-US" dirty="0"/>
-              <a:t> (laboratory)</a:t>
-            </a:r>
-          </a:p>
-          <a:p>
-            <a:r>
-              <a:rPr lang="en-US" dirty="0"/>
-              <a:t>    -&gt; List (</a:t>
-            </a:r>
-            <a:r>
-              <a:rPr lang="en-US" dirty="0" err="1"/>
-              <a:t>laboratorylist</a:t>
-            </a:r>
-            <a:r>
-              <a:rPr lang="en-US" dirty="0"/>
-              <a:t>)</a:t>
-            </a:r>
-          </a:p>
-          <a:p>
-            <a:r>
-              <a:rPr lang="en-US" dirty="0"/>
-              <a:t>    -&gt; Button (</a:t>
-            </a:r>
-            <a:r>
-              <a:rPr lang="en-US" dirty="0" err="1"/>
-              <a:t>add_user_button</a:t>
-            </a:r>
-            <a:r>
-              <a:rPr lang="en-US" dirty="0"/>
-              <a:t>) -&gt; </a:t>
-            </a:r>
-          </a:p>
-          <a:p>
-            <a:r>
-              <a:rPr lang="en-US" dirty="0"/>
-              <a:t>	</a:t>
-            </a:r>
-            <a:r>
-              <a:rPr lang="en-US" dirty="0" err="1"/>
-              <a:t>add_user_col</a:t>
-            </a:r>
-            <a:r>
-              <a:rPr lang="en-US" dirty="0"/>
-              <a:t>(parent, </a:t>
-            </a:r>
-            <a:r>
-              <a:rPr lang="en-US" dirty="0" err="1"/>
-              <a:t>firstname</a:t>
-            </a:r>
-            <a:r>
-              <a:rPr lang="en-US" dirty="0"/>
               <a:t>,</a:t>
             </a:r>
           </a:p>
@@ -5313,17 +5283,7 @@
             </a:r>
             <a:r>
               <a:rPr lang="en-US" dirty="0"/>
-              <a:t>, status, laboratory, connection, grandparent, </a:t>
-            </a:r>
-          </a:p>
-          <a:p>
-            <a:r>
-              <a:rPr lang="en-US" dirty="0" err="1"/>
-              <a:t>grandgrandparent</a:t>
-            </a:r>
-            <a:r>
-              <a:rPr lang="en-US" dirty="0"/>
-              <a:t>)</a:t>
+              <a:t>, status, laboratory, connection, grandparent)</a:t>
             </a:r>
           </a:p>
         </p:txBody>
@@ -5343,7 +5303,7 @@
         <p:spPr>
           <a:xfrm>
             <a:off x="6601691" y="1690688"/>
-            <a:ext cx="5312865" cy="2862322"/>
+            <a:ext cx="5383397" cy="2308324"/>
           </a:xfrm>
           <a:prstGeom prst="rect">
             <a:avLst/>
@@ -5367,7 +5327,7 @@
             </a:r>
             <a:r>
               <a:rPr lang="en-US" dirty="0"/>
-              <a:t> (parent, </a:t>
+              <a:t> (popup, </a:t>
             </a:r>
             <a:r>
               <a:rPr lang="en-US" dirty="0" err="1"/>
@@ -5385,17 +5345,7 @@
             </a:r>
             <a:r>
               <a:rPr lang="en-US" dirty="0"/>
-              <a:t>, status, laboratory, connection, grandparent,</a:t>
-            </a:r>
-          </a:p>
-          <a:p>
-            <a:r>
-              <a:rPr lang="en-US" dirty="0" err="1"/>
-              <a:t>grandgrandparent</a:t>
-            </a:r>
-            <a:r>
-              <a:rPr lang="en-US" dirty="0"/>
-              <a:t>)</a:t>
+              <a:t>, status, laboratory, connection, grandparent)</a:t>
             </a:r>
           </a:p>
           <a:p>
@@ -5481,7 +5431,7 @@
             </a:r>
             <a:r>
               <a:rPr lang="en-US" dirty="0" err="1"/>
-              <a:t>parent.destroy</a:t>
+              <a:t>popup.destroy</a:t>
             </a:r>
             <a:r>
               <a:rPr lang="en-US" dirty="0"/>
@@ -5499,17 +5449,7 @@
             </a:r>
             <a:r>
               <a:rPr lang="en-US" dirty="0"/>
-              <a:t>(grandparent, ‘user’, connection, </a:t>
-            </a:r>
-          </a:p>
-          <a:p>
-            <a:r>
-              <a:rPr lang="en-US" dirty="0" err="1"/>
-              <a:t>grandgrandparent</a:t>
-            </a:r>
-            <a:r>
-              <a:rPr lang="en-US" dirty="0"/>
-              <a:t>)</a:t>
+              <a:t>(‘user’, connection, grandparent)</a:t>
             </a:r>
           </a:p>
         </p:txBody>
@@ -5576,7 +5516,7 @@
             </a:r>
             <a:r>
               <a:rPr lang="en-US" dirty="0"/>
-              <a:t>(parent, </a:t>
+              <a:t>(</a:t>
             </a:r>
             <a:r>
               <a:rPr lang="en-US" dirty="0" err="1"/>
@@ -5604,7 +5544,7 @@
         <p:spPr>
           <a:xfrm>
             <a:off x="838200" y="1825625"/>
-            <a:ext cx="5942717" cy="1200329"/>
+            <a:ext cx="5452968" cy="1200329"/>
           </a:xfrm>
           <a:prstGeom prst="rect">
             <a:avLst/>
@@ -5628,7 +5568,7 @@
             </a:r>
             <a:r>
               <a:rPr lang="en-US" dirty="0"/>
-              <a:t> (parent, </a:t>
+              <a:t> (</a:t>
             </a:r>
             <a:r>
               <a:rPr lang="en-US" dirty="0" err="1"/>
@@ -5949,7 +5889,7 @@
             <a:pPr lvl="6"/>
             <a:r>
               <a:rPr lang="en-US" dirty="0" err="1"/>
-              <a:t>Delete_button</a:t>
+              <a:t>Del_button</a:t>
             </a:r>
             <a:r>
               <a:rPr lang="en-US" dirty="0"/>
@@ -6044,15 +5984,7 @@
             </a:r>
             <a:r>
               <a:rPr lang="en-US" dirty="0"/>
-              <a:t> (</a:t>
-            </a:r>
-            <a:r>
-              <a:rPr lang="en-US" dirty="0" err="1"/>
-              <a:t>tab_user</a:t>
-            </a:r>
-            <a:r>
-              <a:rPr lang="en-US" dirty="0"/>
-              <a:t>, connection, ‘user’, </a:t>
+              <a:t> (connection, ‘user’, </a:t>
             </a:r>
             <a:r>
               <a:rPr lang="en-US" dirty="0" err="1"/>
@@ -6110,19 +6042,7 @@
               <a:rPr lang="en-US" dirty="0">
                 <a:sym typeface="Wingdings" panose="05000000000000000000" pitchFamily="2" charset="2"/>
               </a:rPr>
-              <a:t> (</a:t>
-            </a:r>
-            <a:r>
-              <a:rPr lang="en-US" dirty="0" err="1">
-                <a:sym typeface="Wingdings" panose="05000000000000000000" pitchFamily="2" charset="2"/>
-              </a:rPr>
-              <a:t>tab_user</a:t>
-            </a:r>
-            <a:r>
-              <a:rPr lang="en-US" dirty="0">
-                <a:sym typeface="Wingdings" panose="05000000000000000000" pitchFamily="2" charset="2"/>
-              </a:rPr>
-              <a:t>, connection, ‘user’, </a:t>
+              <a:t> (‘user’, connection, </a:t>
             </a:r>
             <a:r>
               <a:rPr lang="en-US" dirty="0" err="1">
@@ -6413,14 +6333,6 @@
             </a:r>
             <a:r>
               <a:rPr lang="en-US" dirty="0" err="1"/>
-              <a:t>tab_user</a:t>
-            </a:r>
-            <a:r>
-              <a:rPr lang="en-US" dirty="0"/>
-              <a:t>, </a:t>
-            </a:r>
-            <a:r>
-              <a:rPr lang="en-US" dirty="0" err="1"/>
               <a:t>tabcontrol_user</a:t>
             </a:r>
             <a:r>
@@ -6499,19 +6411,7 @@
               <a:rPr lang="en-US" dirty="0">
                 <a:sym typeface="Wingdings" panose="05000000000000000000" pitchFamily="2" charset="2"/>
               </a:rPr>
-              <a:t>(</a:t>
-            </a:r>
-            <a:r>
-              <a:rPr lang="en-US" dirty="0" err="1">
-                <a:sym typeface="Wingdings" panose="05000000000000000000" pitchFamily="2" charset="2"/>
-              </a:rPr>
-              <a:t>tab_user</a:t>
-            </a:r>
-            <a:r>
-              <a:rPr lang="en-US" dirty="0">
-                <a:sym typeface="Wingdings" panose="05000000000000000000" pitchFamily="2" charset="2"/>
-              </a:rPr>
-              <a:t>, connection, ‘user’, </a:t>
+              <a:t>(‘user’, connection, </a:t>
             </a:r>
             <a:r>
               <a:rPr lang="en-US" dirty="0" err="1">

</xml_diff>

<commit_message>
add university tab in user tab
</commit_message>
<xml_diff>
--- a/GUI_schema.pptx
+++ b/GUI_schema.pptx
@@ -17,6 +17,9 @@
     <p:sldId id="266" r:id="rId11"/>
     <p:sldId id="268" r:id="rId12"/>
     <p:sldId id="269" r:id="rId13"/>
+    <p:sldId id="270" r:id="rId14"/>
+    <p:sldId id="271" r:id="rId15"/>
+    <p:sldId id="272" r:id="rId16"/>
   </p:sldIdLst>
   <p:sldSz cx="12192000" cy="6858000"/>
   <p:notesSz cx="6858000" cy="9144000"/>
@@ -3715,7 +3718,7 @@
             </a:r>
             <a:r>
               <a:rPr lang="en-US" dirty="0"/>
-              <a:t>, connection, ‘user’, </a:t>
+              <a:t>, connection, ‘status’, </a:t>
             </a:r>
             <a:r>
               <a:rPr lang="en-US" dirty="0" err="1"/>
@@ -4534,7 +4537,7 @@
         </p:nvSpPr>
         <p:spPr>
           <a:xfrm>
-            <a:off x="5970403" y="1690688"/>
+            <a:off x="5849633" y="1690688"/>
             <a:ext cx="5322996" cy="1200329"/>
           </a:xfrm>
           <a:prstGeom prst="rect">
@@ -4600,12 +4603,8 @@
               <a:t>update_table</a:t>
             </a:r>
             <a:r>
-              <a:rPr lang="en-US"/>
-              <a:t>(‘status’, </a:t>
-            </a:r>
-            <a:r>
-              <a:rPr lang="en-US" dirty="0"/>
-              <a:t>connection, grandparent)</a:t>
+              <a:rPr lang="en-US" dirty="0"/>
+              <a:t>(‘status’, connection, grandparent)</a:t>
             </a:r>
           </a:p>
         </p:txBody>
@@ -4614,6 +4613,1476 @@
     <p:extLst>
       <p:ext uri="{BB962C8B-B14F-4D97-AF65-F5344CB8AC3E}">
         <p14:creationId xmlns:p14="http://schemas.microsoft.com/office/powerpoint/2010/main" val="1971536948"/>
+      </p:ext>
+    </p:extLst>
+  </p:cSld>
+  <p:clrMapOvr>
+    <a:masterClrMapping/>
+  </p:clrMapOvr>
+</p:sld>
+</file>
+
+<file path=ppt/slides/slide13.xml><?xml version="1.0" encoding="utf-8"?>
+<p:sld xmlns:a="http://schemas.openxmlformats.org/drawingml/2006/main" xmlns:r="http://schemas.openxmlformats.org/officeDocument/2006/relationships" xmlns:p="http://schemas.openxmlformats.org/presentationml/2006/main">
+  <p:cSld>
+    <p:spTree>
+      <p:nvGrpSpPr>
+        <p:cNvPr id="1" name=""/>
+        <p:cNvGrpSpPr/>
+        <p:nvPr/>
+      </p:nvGrpSpPr>
+      <p:grpSpPr>
+        <a:xfrm>
+          <a:off x="0" y="0"/>
+          <a:ext cx="0" cy="0"/>
+          <a:chOff x="0" y="0"/>
+          <a:chExt cx="0" cy="0"/>
+        </a:xfrm>
+      </p:grpSpPr>
+      <p:sp>
+        <p:nvSpPr>
+          <p:cNvPr id="3" name="Content Placeholder 2">
+            <a:extLst>
+              <a:ext uri="{FF2B5EF4-FFF2-40B4-BE49-F238E27FC236}">
+                <a16:creationId xmlns:a16="http://schemas.microsoft.com/office/drawing/2014/main" id="{11AEA356-8B4C-ACFD-31B3-63441A398B00}"/>
+              </a:ext>
+            </a:extLst>
+          </p:cNvPr>
+          <p:cNvSpPr>
+            <a:spLocks noGrp="1"/>
+          </p:cNvSpPr>
+          <p:nvPr>
+            <p:ph idx="1"/>
+          </p:nvPr>
+        </p:nvSpPr>
+        <p:spPr>
+          <a:xfrm>
+            <a:off x="599274" y="1086930"/>
+            <a:ext cx="10515600" cy="5374256"/>
+          </a:xfrm>
+        </p:spPr>
+        <p:txBody>
+          <a:bodyPr>
+            <a:normAutofit fontScale="32500" lnSpcReduction="20000"/>
+          </a:bodyPr>
+          <a:lstStyle/>
+          <a:p>
+            <a:r>
+              <a:rPr lang="en-US" dirty="0"/>
+              <a:t>Root </a:t>
+            </a:r>
+            <a:r>
+              <a:rPr lang="en-US" dirty="0">
+                <a:sym typeface="Wingdings" panose="05000000000000000000" pitchFamily="2" charset="2"/>
+              </a:rPr>
+              <a:t> </a:t>
+            </a:r>
+            <a:r>
+              <a:rPr lang="en-US" dirty="0" err="1">
+                <a:sym typeface="Wingdings" panose="05000000000000000000" pitchFamily="2" charset="2"/>
+              </a:rPr>
+              <a:t>dbmenu</a:t>
+            </a:r>
+            <a:r>
+              <a:rPr lang="en-US" dirty="0">
+                <a:sym typeface="Wingdings" panose="05000000000000000000" pitchFamily="2" charset="2"/>
+              </a:rPr>
+              <a:t> [Menu] -&gt; data</a:t>
+            </a:r>
+          </a:p>
+          <a:p>
+            <a:pPr lvl="1"/>
+            <a:r>
+              <a:rPr lang="en-US" dirty="0" err="1"/>
+              <a:t>dbframe</a:t>
+            </a:r>
+            <a:r>
+              <a:rPr lang="en-US" dirty="0"/>
+              <a:t> [Frame(root)]</a:t>
+            </a:r>
+          </a:p>
+          <a:p>
+            <a:pPr lvl="2"/>
+            <a:r>
+              <a:rPr lang="en-US" dirty="0" err="1"/>
+              <a:t>dbname</a:t>
+            </a:r>
+            <a:r>
+              <a:rPr lang="en-US" dirty="0"/>
+              <a:t>(data) [Label(</a:t>
+            </a:r>
+            <a:r>
+              <a:rPr lang="en-US" dirty="0" err="1"/>
+              <a:t>dbframe</a:t>
+            </a:r>
+            <a:r>
+              <a:rPr lang="en-US" dirty="0"/>
+              <a:t>)] </a:t>
+            </a:r>
+            <a:r>
+              <a:rPr lang="en-US" dirty="0">
+                <a:sym typeface="Wingdings" panose="05000000000000000000" pitchFamily="2" charset="2"/>
+              </a:rPr>
+              <a:t> connection</a:t>
+            </a:r>
+            <a:r>
+              <a:rPr lang="en-US" dirty="0"/>
+              <a:t> </a:t>
+            </a:r>
+          </a:p>
+          <a:p>
+            <a:pPr lvl="1"/>
+            <a:r>
+              <a:rPr lang="en-US" dirty="0" err="1"/>
+              <a:t>tabframe</a:t>
+            </a:r>
+            <a:r>
+              <a:rPr lang="en-US" dirty="0"/>
+              <a:t>(connection) [Frame(root)]</a:t>
+            </a:r>
+          </a:p>
+          <a:p>
+            <a:pPr lvl="2"/>
+            <a:r>
+              <a:rPr lang="en-US" dirty="0" err="1"/>
+              <a:t>Tabcontrol</a:t>
+            </a:r>
+            <a:r>
+              <a:rPr lang="en-US" dirty="0"/>
+              <a:t>(connection) [Notebook(</a:t>
+            </a:r>
+            <a:r>
+              <a:rPr lang="en-US" dirty="0" err="1"/>
+              <a:t>tabframe</a:t>
+            </a:r>
+            <a:r>
+              <a:rPr lang="en-US" dirty="0"/>
+              <a:t>)]</a:t>
+            </a:r>
+          </a:p>
+          <a:p>
+            <a:pPr lvl="3"/>
+            <a:r>
+              <a:rPr lang="en-US" dirty="0" err="1"/>
+              <a:t>User_tab</a:t>
+            </a:r>
+            <a:r>
+              <a:rPr lang="en-US" dirty="0"/>
+              <a:t> (</a:t>
+            </a:r>
+            <a:r>
+              <a:rPr lang="en-US" dirty="0" err="1"/>
+              <a:t>tabcontrol</a:t>
+            </a:r>
+            <a:r>
+              <a:rPr lang="en-US" dirty="0"/>
+              <a:t>, connection) [Frame(</a:t>
+            </a:r>
+            <a:r>
+              <a:rPr lang="en-US" dirty="0" err="1"/>
+              <a:t>tabcontrol</a:t>
+            </a:r>
+            <a:r>
+              <a:rPr lang="en-US" dirty="0"/>
+              <a:t>)]</a:t>
+            </a:r>
+          </a:p>
+          <a:p>
+            <a:pPr lvl="4"/>
+            <a:r>
+              <a:rPr lang="en-US" dirty="0" err="1"/>
+              <a:t>Tabcontrol_user</a:t>
+            </a:r>
+            <a:r>
+              <a:rPr lang="en-US" dirty="0"/>
+              <a:t> (</a:t>
+            </a:r>
+            <a:r>
+              <a:rPr lang="en-US" dirty="0" err="1"/>
+              <a:t>tabcontrol</a:t>
+            </a:r>
+            <a:r>
+              <a:rPr lang="en-US" dirty="0"/>
+              <a:t>) [Notebook(</a:t>
+            </a:r>
+            <a:r>
+              <a:rPr lang="en-US" dirty="0" err="1"/>
+              <a:t>user_tab</a:t>
+            </a:r>
+            <a:r>
+              <a:rPr lang="en-US" dirty="0"/>
+              <a:t>)]</a:t>
+            </a:r>
+          </a:p>
+          <a:p>
+            <a:pPr lvl="5"/>
+            <a:r>
+              <a:rPr lang="en-US" dirty="0" err="1"/>
+              <a:t>Tab_user</a:t>
+            </a:r>
+            <a:r>
+              <a:rPr lang="en-US" dirty="0"/>
+              <a:t> (</a:t>
+            </a:r>
+            <a:r>
+              <a:rPr lang="en-US" dirty="0" err="1"/>
+              <a:t>tabcontrol_user</a:t>
+            </a:r>
+            <a:r>
+              <a:rPr lang="en-US" dirty="0"/>
+              <a:t>, connection) [Frame(</a:t>
+            </a:r>
+            <a:r>
+              <a:rPr lang="en-US" dirty="0" err="1"/>
+              <a:t>tabcontol_user</a:t>
+            </a:r>
+            <a:r>
+              <a:rPr lang="en-US" dirty="0"/>
+              <a:t>)]</a:t>
+            </a:r>
+          </a:p>
+          <a:p>
+            <a:pPr lvl="5"/>
+            <a:r>
+              <a:rPr lang="en-US" dirty="0" err="1"/>
+              <a:t>Tab_status</a:t>
+            </a:r>
+            <a:r>
+              <a:rPr lang="en-US" dirty="0"/>
+              <a:t> (</a:t>
+            </a:r>
+            <a:r>
+              <a:rPr lang="en-US" dirty="0" err="1"/>
+              <a:t>tabcontrol_user</a:t>
+            </a:r>
+            <a:r>
+              <a:rPr lang="en-US" dirty="0"/>
+              <a:t>, connection) [Frame(</a:t>
+            </a:r>
+            <a:r>
+              <a:rPr lang="en-US" dirty="0" err="1"/>
+              <a:t>tabcontol_user</a:t>
+            </a:r>
+            <a:r>
+              <a:rPr lang="en-US" dirty="0"/>
+              <a:t>)]</a:t>
+            </a:r>
+          </a:p>
+          <a:p>
+            <a:pPr lvl="5"/>
+            <a:r>
+              <a:rPr lang="en-US" dirty="0" err="1"/>
+              <a:t>Tab_university</a:t>
+            </a:r>
+            <a:r>
+              <a:rPr lang="en-US" dirty="0"/>
+              <a:t> (</a:t>
+            </a:r>
+            <a:r>
+              <a:rPr lang="en-US" dirty="0" err="1"/>
+              <a:t>tabcontrol_user</a:t>
+            </a:r>
+            <a:r>
+              <a:rPr lang="en-US" dirty="0"/>
+              <a:t>, connection) [Frame(</a:t>
+            </a:r>
+            <a:r>
+              <a:rPr lang="en-US" dirty="0" err="1"/>
+              <a:t>tabcontol_user</a:t>
+            </a:r>
+            <a:r>
+              <a:rPr lang="en-US" dirty="0"/>
+              <a:t>)]</a:t>
+            </a:r>
+          </a:p>
+          <a:p>
+            <a:pPr lvl="6"/>
+            <a:r>
+              <a:rPr lang="en-US" dirty="0" err="1"/>
+              <a:t>label_university</a:t>
+            </a:r>
+            <a:r>
+              <a:rPr lang="en-US" dirty="0"/>
+              <a:t> (connection, res) [Label(</a:t>
+            </a:r>
+            <a:r>
+              <a:rPr lang="en-US" dirty="0" err="1"/>
+              <a:t>tab_status</a:t>
+            </a:r>
+            <a:r>
+              <a:rPr lang="en-US" dirty="0"/>
+              <a:t>)]</a:t>
+            </a:r>
+          </a:p>
+          <a:p>
+            <a:pPr lvl="6"/>
+            <a:r>
+              <a:rPr lang="en-US" dirty="0" err="1"/>
+              <a:t>university_tree</a:t>
+            </a:r>
+            <a:r>
+              <a:rPr lang="en-US" dirty="0"/>
+              <a:t> [</a:t>
+            </a:r>
+            <a:r>
+              <a:rPr lang="en-US" dirty="0" err="1"/>
+              <a:t>TreeView</a:t>
+            </a:r>
+            <a:r>
+              <a:rPr lang="en-US" dirty="0"/>
+              <a:t>(</a:t>
+            </a:r>
+            <a:r>
+              <a:rPr lang="en-US" dirty="0" err="1"/>
+              <a:t>tab_status</a:t>
+            </a:r>
+            <a:r>
+              <a:rPr lang="en-US" dirty="0"/>
+              <a:t>)]</a:t>
+            </a:r>
+          </a:p>
+          <a:p>
+            <a:pPr lvl="6"/>
+            <a:r>
+              <a:rPr lang="en-US" dirty="0" err="1"/>
+              <a:t>Del_button</a:t>
+            </a:r>
+            <a:r>
+              <a:rPr lang="en-US" dirty="0"/>
+              <a:t> (</a:t>
+            </a:r>
+            <a:r>
+              <a:rPr lang="en-US" dirty="0" err="1"/>
+              <a:t>tab_status</a:t>
+            </a:r>
+            <a:r>
+              <a:rPr lang="en-US" dirty="0"/>
+              <a:t>, connection, ‘university’, </a:t>
+            </a:r>
+            <a:r>
+              <a:rPr lang="en-US" dirty="0" err="1"/>
+              <a:t>tabcontrol_user</a:t>
+            </a:r>
+            <a:r>
+              <a:rPr lang="en-US" dirty="0"/>
+              <a:t>) [Button(</a:t>
+            </a:r>
+            <a:r>
+              <a:rPr lang="en-US" dirty="0" err="1"/>
+              <a:t>tab_status</a:t>
+            </a:r>
+            <a:r>
+              <a:rPr lang="en-US" dirty="0"/>
+              <a:t>)]</a:t>
+            </a:r>
+          </a:p>
+          <a:p>
+            <a:pPr lvl="7"/>
+            <a:r>
+              <a:rPr lang="en-US" dirty="0"/>
+              <a:t>Popup [</a:t>
+            </a:r>
+            <a:r>
+              <a:rPr lang="en-US" dirty="0" err="1"/>
+              <a:t>TopLevel</a:t>
+            </a:r>
+            <a:r>
+              <a:rPr lang="en-US" dirty="0"/>
+              <a:t>]</a:t>
+            </a:r>
+          </a:p>
+          <a:p>
+            <a:pPr lvl="8"/>
+            <a:r>
+              <a:rPr lang="en-US" dirty="0" err="1"/>
+              <a:t>Del_label</a:t>
+            </a:r>
+            <a:r>
+              <a:rPr lang="en-US" dirty="0"/>
+              <a:t> [Label(popup)]</a:t>
+            </a:r>
+          </a:p>
+          <a:p>
+            <a:pPr lvl="8"/>
+            <a:r>
+              <a:rPr lang="en-US" dirty="0" err="1"/>
+              <a:t>Id_val</a:t>
+            </a:r>
+            <a:r>
+              <a:rPr lang="en-US" dirty="0"/>
+              <a:t> [</a:t>
+            </a:r>
+            <a:r>
+              <a:rPr lang="en-US" dirty="0" err="1"/>
+              <a:t>StringVar</a:t>
+            </a:r>
+            <a:r>
+              <a:rPr lang="en-US" dirty="0"/>
+              <a:t>(popup)]</a:t>
+            </a:r>
+          </a:p>
+          <a:p>
+            <a:pPr lvl="8"/>
+            <a:r>
+              <a:rPr lang="en-US" dirty="0" err="1"/>
+              <a:t>Id_entry</a:t>
+            </a:r>
+            <a:r>
+              <a:rPr lang="en-US" dirty="0"/>
+              <a:t> [Entry(popup)]</a:t>
+            </a:r>
+          </a:p>
+          <a:p>
+            <a:pPr lvl="8"/>
+            <a:r>
+              <a:rPr lang="en-US" dirty="0" err="1"/>
+              <a:t>Ok_button</a:t>
+            </a:r>
+            <a:r>
+              <a:rPr lang="en-US" dirty="0"/>
+              <a:t> (connection, ‘university’, </a:t>
+            </a:r>
+            <a:r>
+              <a:rPr lang="en-US" dirty="0" err="1"/>
+              <a:t>tabcontrol_user</a:t>
+            </a:r>
+            <a:r>
+              <a:rPr lang="en-US" dirty="0"/>
+              <a:t>) [Button(popup)]</a:t>
+            </a:r>
+          </a:p>
+          <a:p>
+            <a:pPr marL="3657600" lvl="8" indent="0">
+              <a:buNone/>
+            </a:pPr>
+            <a:r>
+              <a:rPr lang="en-US" dirty="0"/>
+              <a:t>                 </a:t>
+            </a:r>
+            <a:r>
+              <a:rPr lang="en-US" dirty="0">
+                <a:sym typeface="Wingdings" panose="05000000000000000000" pitchFamily="2" charset="2"/>
+              </a:rPr>
+              <a:t> </a:t>
+            </a:r>
+            <a:r>
+              <a:rPr lang="en-US" dirty="0" err="1"/>
+              <a:t>MessageBox</a:t>
+            </a:r>
+            <a:r>
+              <a:rPr lang="en-US" dirty="0"/>
+              <a:t> (connection, ‘status’)</a:t>
+            </a:r>
+          </a:p>
+          <a:p>
+            <a:pPr marL="3657600" lvl="8" indent="0">
+              <a:buNone/>
+            </a:pPr>
+            <a:r>
+              <a:rPr lang="en-US" dirty="0"/>
+              <a:t>                 </a:t>
+            </a:r>
+            <a:r>
+              <a:rPr lang="en-US" dirty="0">
+                <a:sym typeface="Wingdings" panose="05000000000000000000" pitchFamily="2" charset="2"/>
+              </a:rPr>
+              <a:t> </a:t>
+            </a:r>
+            <a:r>
+              <a:rPr lang="en-US" dirty="0" err="1">
+                <a:sym typeface="Wingdings" panose="05000000000000000000" pitchFamily="2" charset="2"/>
+              </a:rPr>
+              <a:t>Updatetable</a:t>
+            </a:r>
+            <a:r>
+              <a:rPr lang="en-US" dirty="0">
+                <a:sym typeface="Wingdings" panose="05000000000000000000" pitchFamily="2" charset="2"/>
+              </a:rPr>
+              <a:t> (‘university’, connection, </a:t>
+            </a:r>
+            <a:r>
+              <a:rPr lang="en-US" dirty="0" err="1">
+                <a:sym typeface="Wingdings" panose="05000000000000000000" pitchFamily="2" charset="2"/>
+              </a:rPr>
+              <a:t>tabcontrol_user</a:t>
+            </a:r>
+            <a:r>
+              <a:rPr lang="en-US" dirty="0">
+                <a:sym typeface="Wingdings" panose="05000000000000000000" pitchFamily="2" charset="2"/>
+              </a:rPr>
+              <a:t>) </a:t>
+            </a:r>
+          </a:p>
+          <a:p>
+            <a:pPr marL="3657600" lvl="8" indent="0">
+              <a:buNone/>
+            </a:pPr>
+            <a:r>
+              <a:rPr lang="en-US" dirty="0"/>
+              <a:t>                 </a:t>
+            </a:r>
+            <a:r>
+              <a:rPr lang="en-US" dirty="0">
+                <a:sym typeface="Wingdings" panose="05000000000000000000" pitchFamily="2" charset="2"/>
+              </a:rPr>
+              <a:t> </a:t>
+            </a:r>
+            <a:r>
+              <a:rPr lang="en-US" dirty="0" err="1">
+                <a:sym typeface="Wingdings" panose="05000000000000000000" pitchFamily="2" charset="2"/>
+              </a:rPr>
+              <a:t>popup.destroy</a:t>
+            </a:r>
+            <a:r>
+              <a:rPr lang="en-US" dirty="0">
+                <a:sym typeface="Wingdings" panose="05000000000000000000" pitchFamily="2" charset="2"/>
+              </a:rPr>
+              <a:t>()</a:t>
+            </a:r>
+            <a:endParaRPr lang="en-US" dirty="0"/>
+          </a:p>
+          <a:p>
+            <a:pPr lvl="6"/>
+            <a:r>
+              <a:rPr lang="en-US" dirty="0" err="1"/>
+              <a:t>Add_button</a:t>
+            </a:r>
+            <a:r>
+              <a:rPr lang="en-US" dirty="0"/>
+              <a:t> (</a:t>
+            </a:r>
+            <a:r>
+              <a:rPr lang="en-US" dirty="0" err="1"/>
+              <a:t>tab_status</a:t>
+            </a:r>
+            <a:r>
+              <a:rPr lang="en-US" dirty="0"/>
+              <a:t>, connection, ‘university’, </a:t>
+            </a:r>
+            <a:r>
+              <a:rPr lang="en-US" dirty="0" err="1"/>
+              <a:t>tabcontrol_status</a:t>
+            </a:r>
+            <a:r>
+              <a:rPr lang="en-US" dirty="0"/>
+              <a:t>) [Button(</a:t>
+            </a:r>
+            <a:r>
+              <a:rPr lang="en-US" dirty="0" err="1"/>
+              <a:t>tab_status</a:t>
+            </a:r>
+            <a:r>
+              <a:rPr lang="en-US" dirty="0"/>
+              <a:t>)] </a:t>
+            </a:r>
+          </a:p>
+          <a:p>
+            <a:pPr lvl="7"/>
+            <a:r>
+              <a:rPr lang="en-US" dirty="0"/>
+              <a:t>Popup [</a:t>
+            </a:r>
+            <a:r>
+              <a:rPr lang="en-US" dirty="0" err="1"/>
+              <a:t>TopLevel</a:t>
+            </a:r>
+            <a:r>
+              <a:rPr lang="en-US" dirty="0"/>
+              <a:t>]</a:t>
+            </a:r>
+          </a:p>
+          <a:p>
+            <a:pPr lvl="8"/>
+            <a:r>
+              <a:rPr lang="en-US" dirty="0" err="1"/>
+              <a:t>name_lab</a:t>
+            </a:r>
+            <a:r>
+              <a:rPr lang="en-US" dirty="0"/>
+              <a:t> [Label(popup)]</a:t>
+            </a:r>
+          </a:p>
+          <a:p>
+            <a:pPr lvl="8"/>
+            <a:r>
+              <a:rPr lang="en-US" dirty="0"/>
+              <a:t>name [</a:t>
+            </a:r>
+            <a:r>
+              <a:rPr lang="en-US" dirty="0" err="1"/>
+              <a:t>StringVar</a:t>
+            </a:r>
+            <a:r>
+              <a:rPr lang="en-US" dirty="0"/>
+              <a:t>(popup)]</a:t>
+            </a:r>
+          </a:p>
+          <a:p>
+            <a:pPr lvl="8"/>
+            <a:r>
+              <a:rPr lang="en-US" dirty="0" err="1"/>
+              <a:t>name_entry</a:t>
+            </a:r>
+            <a:r>
+              <a:rPr lang="en-US" dirty="0"/>
+              <a:t> [Entry(popup)]</a:t>
+            </a:r>
+          </a:p>
+          <a:p>
+            <a:pPr lvl="8"/>
+            <a:r>
+              <a:rPr lang="en-US" dirty="0" err="1"/>
+              <a:t>country_lab</a:t>
+            </a:r>
+            <a:r>
+              <a:rPr lang="en-US" dirty="0"/>
+              <a:t> [Label(popup)]</a:t>
+            </a:r>
+          </a:p>
+          <a:p>
+            <a:pPr lvl="8"/>
+            <a:r>
+              <a:rPr lang="en-US" dirty="0"/>
+              <a:t>country [</a:t>
+            </a:r>
+            <a:r>
+              <a:rPr lang="en-US" dirty="0" err="1"/>
+              <a:t>StringVar</a:t>
+            </a:r>
+            <a:r>
+              <a:rPr lang="en-US" dirty="0"/>
+              <a:t>(popup)]</a:t>
+            </a:r>
+          </a:p>
+          <a:p>
+            <a:pPr lvl="8"/>
+            <a:r>
+              <a:rPr lang="en-US" dirty="0"/>
+              <a:t>country _entry [Entry(popup)]</a:t>
+            </a:r>
+            <a:endParaRPr lang="en-US" b="1" dirty="0"/>
+          </a:p>
+          <a:p>
+            <a:pPr lvl="8"/>
+            <a:r>
+              <a:rPr lang="en-US" dirty="0" err="1"/>
+              <a:t>city_lab</a:t>
+            </a:r>
+            <a:r>
+              <a:rPr lang="en-US" dirty="0"/>
+              <a:t> [Label(popup)]</a:t>
+            </a:r>
+          </a:p>
+          <a:p>
+            <a:pPr lvl="8"/>
+            <a:r>
+              <a:rPr lang="en-US" dirty="0"/>
+              <a:t>city [</a:t>
+            </a:r>
+            <a:r>
+              <a:rPr lang="en-US" dirty="0" err="1"/>
+              <a:t>StringVar</a:t>
+            </a:r>
+            <a:r>
+              <a:rPr lang="en-US" dirty="0"/>
+              <a:t>(popup)]</a:t>
+            </a:r>
+          </a:p>
+          <a:p>
+            <a:pPr lvl="8"/>
+            <a:r>
+              <a:rPr lang="en-US" dirty="0"/>
+              <a:t>city _entry [Entry(popup)]</a:t>
+            </a:r>
+            <a:endParaRPr lang="en-US" b="1" dirty="0"/>
+          </a:p>
+          <a:p>
+            <a:pPr lvl="8"/>
+            <a:r>
+              <a:rPr lang="en-US" dirty="0" err="1"/>
+              <a:t>address_lab</a:t>
+            </a:r>
+            <a:r>
+              <a:rPr lang="en-US" dirty="0"/>
+              <a:t> [Label(popup)]</a:t>
+            </a:r>
+          </a:p>
+          <a:p>
+            <a:pPr lvl="8"/>
+            <a:r>
+              <a:rPr lang="en-US" dirty="0"/>
+              <a:t>address [</a:t>
+            </a:r>
+            <a:r>
+              <a:rPr lang="en-US" dirty="0" err="1"/>
+              <a:t>StringVar</a:t>
+            </a:r>
+            <a:r>
+              <a:rPr lang="en-US" dirty="0"/>
+              <a:t>(popup)]</a:t>
+            </a:r>
+          </a:p>
+          <a:p>
+            <a:pPr lvl="8"/>
+            <a:r>
+              <a:rPr lang="en-US" dirty="0"/>
+              <a:t>address _entry [Entry(popup)]</a:t>
+            </a:r>
+            <a:endParaRPr lang="en-US" b="1" dirty="0"/>
+          </a:p>
+          <a:p>
+            <a:pPr lvl="8"/>
+            <a:r>
+              <a:rPr lang="en-US" dirty="0" err="1"/>
+              <a:t>Add_status_button</a:t>
+            </a:r>
+            <a:r>
+              <a:rPr lang="en-US" dirty="0"/>
+              <a:t> (popup, name, country, city, address, connection, </a:t>
+            </a:r>
+            <a:r>
+              <a:rPr lang="en-US" dirty="0" err="1"/>
+              <a:t>tabcontrol_user</a:t>
+            </a:r>
+            <a:r>
+              <a:rPr lang="en-US" dirty="0"/>
+              <a:t>) [Button(popup)]</a:t>
+            </a:r>
+          </a:p>
+          <a:p>
+            <a:pPr marL="3657600" lvl="8" indent="0">
+              <a:buNone/>
+            </a:pPr>
+            <a:r>
+              <a:rPr lang="en-US" dirty="0"/>
+              <a:t>                     </a:t>
+            </a:r>
+            <a:r>
+              <a:rPr lang="en-US" dirty="0">
+                <a:sym typeface="Wingdings" panose="05000000000000000000" pitchFamily="2" charset="2"/>
+              </a:rPr>
+              <a:t> </a:t>
+            </a:r>
+            <a:r>
+              <a:rPr lang="en-US" dirty="0" err="1">
+                <a:sym typeface="Wingdings" panose="05000000000000000000" pitchFamily="2" charset="2"/>
+              </a:rPr>
+              <a:t>add_row_university_table</a:t>
+            </a:r>
+            <a:r>
+              <a:rPr lang="en-US" dirty="0">
+                <a:sym typeface="Wingdings" panose="05000000000000000000" pitchFamily="2" charset="2"/>
+              </a:rPr>
+              <a:t>(name, </a:t>
+            </a:r>
+            <a:r>
+              <a:rPr lang="en-US" dirty="0" err="1">
+                <a:sym typeface="Wingdings" panose="05000000000000000000" pitchFamily="2" charset="2"/>
+              </a:rPr>
+              <a:t>couuntry</a:t>
+            </a:r>
+            <a:r>
+              <a:rPr lang="en-US" dirty="0">
+                <a:sym typeface="Wingdings" panose="05000000000000000000" pitchFamily="2" charset="2"/>
+              </a:rPr>
+              <a:t>, city, address, connection)</a:t>
+            </a:r>
+          </a:p>
+          <a:p>
+            <a:pPr marL="3657600" lvl="8" indent="0">
+              <a:buNone/>
+            </a:pPr>
+            <a:r>
+              <a:rPr lang="en-US" dirty="0">
+                <a:sym typeface="Wingdings" panose="05000000000000000000" pitchFamily="2" charset="2"/>
+              </a:rPr>
+              <a:t>                      </a:t>
+            </a:r>
+            <a:r>
+              <a:rPr lang="en-US" dirty="0" err="1">
+                <a:sym typeface="Wingdings" panose="05000000000000000000" pitchFamily="2" charset="2"/>
+              </a:rPr>
+              <a:t>updtaetable</a:t>
+            </a:r>
+            <a:r>
+              <a:rPr lang="en-US" dirty="0">
+                <a:sym typeface="Wingdings" panose="05000000000000000000" pitchFamily="2" charset="2"/>
+              </a:rPr>
+              <a:t>(‘university’, connection, </a:t>
+            </a:r>
+            <a:r>
+              <a:rPr lang="en-US" dirty="0" err="1">
+                <a:sym typeface="Wingdings" panose="05000000000000000000" pitchFamily="2" charset="2"/>
+              </a:rPr>
+              <a:t>tabcontrol_user</a:t>
+            </a:r>
+            <a:r>
+              <a:rPr lang="en-US" dirty="0">
+                <a:sym typeface="Wingdings" panose="05000000000000000000" pitchFamily="2" charset="2"/>
+              </a:rPr>
+              <a:t>)</a:t>
+            </a:r>
+          </a:p>
+          <a:p>
+            <a:pPr marL="3657600" lvl="8" indent="0">
+              <a:buNone/>
+            </a:pPr>
+            <a:r>
+              <a:rPr lang="en-US" dirty="0"/>
+              <a:t>                     </a:t>
+            </a:r>
+            <a:r>
+              <a:rPr lang="en-US" dirty="0">
+                <a:sym typeface="Wingdings" panose="05000000000000000000" pitchFamily="2" charset="2"/>
+              </a:rPr>
+              <a:t> </a:t>
+            </a:r>
+            <a:r>
+              <a:rPr lang="en-US" dirty="0" err="1">
+                <a:sym typeface="Wingdings" panose="05000000000000000000" pitchFamily="2" charset="2"/>
+              </a:rPr>
+              <a:t>popup.destroy</a:t>
+            </a:r>
+            <a:r>
+              <a:rPr lang="en-US" dirty="0">
+                <a:sym typeface="Wingdings" panose="05000000000000000000" pitchFamily="2" charset="2"/>
+              </a:rPr>
+              <a:t>()</a:t>
+            </a:r>
+            <a:endParaRPr lang="en-US" dirty="0"/>
+          </a:p>
+          <a:p>
+            <a:pPr lvl="8"/>
+            <a:endParaRPr lang="en-US" dirty="0"/>
+          </a:p>
+          <a:p>
+            <a:pPr lvl="8"/>
+            <a:endParaRPr lang="en-US" dirty="0"/>
+          </a:p>
+          <a:p>
+            <a:pPr lvl="4"/>
+            <a:endParaRPr lang="en-US" dirty="0"/>
+          </a:p>
+          <a:p>
+            <a:pPr lvl="1"/>
+            <a:endParaRPr lang="en-US" dirty="0"/>
+          </a:p>
+        </p:txBody>
+      </p:sp>
+      <p:sp>
+        <p:nvSpPr>
+          <p:cNvPr id="2" name="Title 1">
+            <a:extLst>
+              <a:ext uri="{FF2B5EF4-FFF2-40B4-BE49-F238E27FC236}">
+                <a16:creationId xmlns:a16="http://schemas.microsoft.com/office/drawing/2014/main" id="{B6681FD5-04F6-55B1-994C-69BD9D47A5ED}"/>
+              </a:ext>
+            </a:extLst>
+          </p:cNvPr>
+          <p:cNvSpPr>
+            <a:spLocks noGrp="1"/>
+          </p:cNvSpPr>
+          <p:nvPr>
+            <p:ph type="title"/>
+          </p:nvPr>
+        </p:nvSpPr>
+        <p:spPr>
+          <a:xfrm>
+            <a:off x="277483" y="106332"/>
+            <a:ext cx="10515600" cy="1325563"/>
+          </a:xfrm>
+        </p:spPr>
+        <p:txBody>
+          <a:bodyPr/>
+          <a:lstStyle/>
+          <a:p>
+            <a:r>
+              <a:rPr lang="en-US" dirty="0"/>
+              <a:t>Full Schema (user/university)</a:t>
+            </a:r>
+          </a:p>
+        </p:txBody>
+      </p:sp>
+    </p:spTree>
+    <p:extLst>
+      <p:ext uri="{BB962C8B-B14F-4D97-AF65-F5344CB8AC3E}">
+        <p14:creationId xmlns:p14="http://schemas.microsoft.com/office/powerpoint/2010/main" val="98445701"/>
+      </p:ext>
+    </p:extLst>
+  </p:cSld>
+  <p:clrMapOvr>
+    <a:masterClrMapping/>
+  </p:clrMapOvr>
+</p:sld>
+</file>
+
+<file path=ppt/slides/slide14.xml><?xml version="1.0" encoding="utf-8"?>
+<p:sld xmlns:a="http://schemas.openxmlformats.org/drawingml/2006/main" xmlns:r="http://schemas.openxmlformats.org/officeDocument/2006/relationships" xmlns:p="http://schemas.openxmlformats.org/presentationml/2006/main">
+  <p:cSld>
+    <p:spTree>
+      <p:nvGrpSpPr>
+        <p:cNvPr id="1" name=""/>
+        <p:cNvGrpSpPr/>
+        <p:nvPr/>
+      </p:nvGrpSpPr>
+      <p:grpSpPr>
+        <a:xfrm>
+          <a:off x="0" y="0"/>
+          <a:ext cx="0" cy="0"/>
+          <a:chOff x="0" y="0"/>
+          <a:chExt cx="0" cy="0"/>
+        </a:xfrm>
+      </p:grpSpPr>
+      <p:sp>
+        <p:nvSpPr>
+          <p:cNvPr id="2" name="Title 1">
+            <a:extLst>
+              <a:ext uri="{FF2B5EF4-FFF2-40B4-BE49-F238E27FC236}">
+                <a16:creationId xmlns:a16="http://schemas.microsoft.com/office/drawing/2014/main" id="{EF2BB710-C649-D6CF-DFC8-AD9F3E46E137}"/>
+              </a:ext>
+            </a:extLst>
+          </p:cNvPr>
+          <p:cNvSpPr>
+            <a:spLocks noGrp="1"/>
+          </p:cNvSpPr>
+          <p:nvPr>
+            <p:ph type="title"/>
+          </p:nvPr>
+        </p:nvSpPr>
+        <p:spPr>
+          <a:xfrm>
+            <a:off x="838200" y="235816"/>
+            <a:ext cx="10515600" cy="1325563"/>
+          </a:xfrm>
+        </p:spPr>
+        <p:txBody>
+          <a:bodyPr/>
+          <a:lstStyle/>
+          <a:p>
+            <a:r>
+              <a:rPr lang="en-US" dirty="0"/>
+              <a:t>University tree (parent, connection) </a:t>
+            </a:r>
+          </a:p>
+        </p:txBody>
+      </p:sp>
+      <p:sp>
+        <p:nvSpPr>
+          <p:cNvPr id="9" name="TextBox 8">
+            <a:extLst>
+              <a:ext uri="{FF2B5EF4-FFF2-40B4-BE49-F238E27FC236}">
+                <a16:creationId xmlns:a16="http://schemas.microsoft.com/office/drawing/2014/main" id="{D5B8F1B0-C941-1EDE-CC2B-A1D1D3129546}"/>
+              </a:ext>
+            </a:extLst>
+          </p:cNvPr>
+          <p:cNvSpPr txBox="1"/>
+          <p:nvPr/>
+        </p:nvSpPr>
+        <p:spPr>
+          <a:xfrm>
+            <a:off x="912962" y="1561379"/>
+            <a:ext cx="6032357" cy="2031325"/>
+          </a:xfrm>
+          <a:prstGeom prst="rect">
+            <a:avLst/>
+          </a:prstGeom>
+          <a:noFill/>
+          <a:ln w="19050">
+            <a:solidFill>
+              <a:schemeClr val="tx1"/>
+            </a:solidFill>
+          </a:ln>
+        </p:spPr>
+        <p:txBody>
+          <a:bodyPr wrap="none" rtlCol="0">
+            <a:spAutoFit/>
+          </a:bodyPr>
+          <a:lstStyle/>
+          <a:p>
+            <a:r>
+              <a:rPr lang="en-US" dirty="0" err="1"/>
+              <a:t>StatusTree</a:t>
+            </a:r>
+            <a:r>
+              <a:rPr lang="en-US" dirty="0"/>
+              <a:t> (parent, connection)</a:t>
+            </a:r>
+          </a:p>
+          <a:p>
+            <a:r>
+              <a:rPr lang="en-US" dirty="0"/>
+              <a:t>    -&gt; Frame (</a:t>
+            </a:r>
+            <a:r>
+              <a:rPr lang="en-US" dirty="0" err="1"/>
+              <a:t>tab_university</a:t>
+            </a:r>
+            <a:r>
+              <a:rPr lang="en-US" dirty="0"/>
+              <a:t>) (parent)</a:t>
+            </a:r>
+          </a:p>
+          <a:p>
+            <a:r>
+              <a:rPr lang="en-US" dirty="0"/>
+              <a:t>       -&gt; Label (</a:t>
+            </a:r>
+            <a:r>
+              <a:rPr lang="en-US" dirty="0" err="1"/>
+              <a:t>label_university</a:t>
+            </a:r>
+            <a:r>
+              <a:rPr lang="en-US" dirty="0"/>
+              <a:t>) (connection)</a:t>
+            </a:r>
+          </a:p>
+          <a:p>
+            <a:r>
+              <a:rPr lang="en-US" dirty="0"/>
+              <a:t>       res exists ?</a:t>
+            </a:r>
+          </a:p>
+          <a:p>
+            <a:r>
+              <a:rPr lang="en-US" dirty="0"/>
+              <a:t>        -&gt; </a:t>
+            </a:r>
+            <a:r>
+              <a:rPr lang="en-US" dirty="0" err="1"/>
+              <a:t>Treeview</a:t>
+            </a:r>
+            <a:r>
+              <a:rPr lang="en-US" dirty="0"/>
+              <a:t> (</a:t>
+            </a:r>
+            <a:r>
+              <a:rPr lang="en-US" dirty="0" err="1"/>
+              <a:t>universitytree</a:t>
+            </a:r>
+            <a:r>
+              <a:rPr lang="en-US" dirty="0"/>
+              <a:t>)</a:t>
+            </a:r>
+          </a:p>
+          <a:p>
+            <a:r>
+              <a:rPr lang="en-US" dirty="0"/>
+              <a:t>        -&gt; Button (</a:t>
+            </a:r>
+            <a:r>
+              <a:rPr lang="en-US" dirty="0" err="1"/>
+              <a:t>DeleteButton</a:t>
+            </a:r>
+            <a:r>
+              <a:rPr lang="en-US" dirty="0"/>
+              <a:t>) (connection, ‘university’, parent)</a:t>
+            </a:r>
+          </a:p>
+          <a:p>
+            <a:r>
+              <a:rPr lang="en-US" dirty="0"/>
+              <a:t>        -&gt; Button (</a:t>
+            </a:r>
+            <a:r>
+              <a:rPr lang="en-US" dirty="0" err="1"/>
+              <a:t>AddButton</a:t>
+            </a:r>
+            <a:r>
+              <a:rPr lang="en-US" dirty="0"/>
+              <a:t>) (connection, ‘university’, parent) </a:t>
+            </a:r>
+          </a:p>
+        </p:txBody>
+      </p:sp>
+    </p:spTree>
+    <p:extLst>
+      <p:ext uri="{BB962C8B-B14F-4D97-AF65-F5344CB8AC3E}">
+        <p14:creationId xmlns:p14="http://schemas.microsoft.com/office/powerpoint/2010/main" val="1965892920"/>
+      </p:ext>
+    </p:extLst>
+  </p:cSld>
+  <p:clrMapOvr>
+    <a:masterClrMapping/>
+  </p:clrMapOvr>
+</p:sld>
+</file>
+
+<file path=ppt/slides/slide15.xml><?xml version="1.0" encoding="utf-8"?>
+<p:sld xmlns:a="http://schemas.openxmlformats.org/drawingml/2006/main" xmlns:r="http://schemas.openxmlformats.org/officeDocument/2006/relationships" xmlns:p="http://schemas.openxmlformats.org/presentationml/2006/main">
+  <p:cSld>
+    <p:spTree>
+      <p:nvGrpSpPr>
+        <p:cNvPr id="1" name=""/>
+        <p:cNvGrpSpPr/>
+        <p:nvPr/>
+      </p:nvGrpSpPr>
+      <p:grpSpPr>
+        <a:xfrm>
+          <a:off x="0" y="0"/>
+          <a:ext cx="0" cy="0"/>
+          <a:chOff x="0" y="0"/>
+          <a:chExt cx="0" cy="0"/>
+        </a:xfrm>
+      </p:grpSpPr>
+      <p:sp>
+        <p:nvSpPr>
+          <p:cNvPr id="2" name="Title 1">
+            <a:extLst>
+              <a:ext uri="{FF2B5EF4-FFF2-40B4-BE49-F238E27FC236}">
+                <a16:creationId xmlns:a16="http://schemas.microsoft.com/office/drawing/2014/main" id="{C007879E-F9F3-D649-2FCA-5E1F6960FED0}"/>
+              </a:ext>
+            </a:extLst>
+          </p:cNvPr>
+          <p:cNvSpPr>
+            <a:spLocks noGrp="1"/>
+          </p:cNvSpPr>
+          <p:nvPr>
+            <p:ph type="title"/>
+          </p:nvPr>
+        </p:nvSpPr>
+        <p:spPr/>
+        <p:txBody>
+          <a:bodyPr/>
+          <a:lstStyle/>
+          <a:p>
+            <a:r>
+              <a:rPr lang="en-US" dirty="0" err="1"/>
+              <a:t>StatusAdd</a:t>
+            </a:r>
+            <a:r>
+              <a:rPr lang="en-US" dirty="0"/>
+              <a:t>(popup, connection, grandparent)</a:t>
+            </a:r>
+          </a:p>
+        </p:txBody>
+      </p:sp>
+      <p:sp>
+        <p:nvSpPr>
+          <p:cNvPr id="4" name="TextBox 3">
+            <a:extLst>
+              <a:ext uri="{FF2B5EF4-FFF2-40B4-BE49-F238E27FC236}">
+                <a16:creationId xmlns:a16="http://schemas.microsoft.com/office/drawing/2014/main" id="{A17EC9D8-D908-D618-6C99-2FA6F08D8F9E}"/>
+              </a:ext>
+            </a:extLst>
+          </p:cNvPr>
+          <p:cNvSpPr txBox="1"/>
+          <p:nvPr/>
+        </p:nvSpPr>
+        <p:spPr>
+          <a:xfrm>
+            <a:off x="930564" y="1690688"/>
+            <a:ext cx="4835042" cy="4524315"/>
+          </a:xfrm>
+          <a:prstGeom prst="rect">
+            <a:avLst/>
+          </a:prstGeom>
+          <a:noFill/>
+          <a:ln w="19050">
+            <a:solidFill>
+              <a:schemeClr val="tx1"/>
+            </a:solidFill>
+          </a:ln>
+        </p:spPr>
+        <p:txBody>
+          <a:bodyPr wrap="none" rtlCol="0">
+            <a:spAutoFit/>
+          </a:bodyPr>
+          <a:lstStyle/>
+          <a:p>
+            <a:r>
+              <a:rPr lang="en-US" dirty="0" err="1"/>
+              <a:t>StatusAdd</a:t>
+            </a:r>
+            <a:r>
+              <a:rPr lang="en-US" dirty="0"/>
+              <a:t> (popup, connection, grandparent)</a:t>
+            </a:r>
+          </a:p>
+          <a:p>
+            <a:r>
+              <a:rPr lang="en-US" dirty="0"/>
+              <a:t>    -&gt; Label (</a:t>
+            </a:r>
+            <a:r>
+              <a:rPr lang="en-US" dirty="0" err="1"/>
+              <a:t>name_lab</a:t>
+            </a:r>
+            <a:r>
+              <a:rPr lang="en-US" dirty="0"/>
+              <a:t>)</a:t>
+            </a:r>
+          </a:p>
+          <a:p>
+            <a:r>
+              <a:rPr lang="en-US" dirty="0"/>
+              <a:t>    -&gt; </a:t>
+            </a:r>
+            <a:r>
+              <a:rPr lang="en-US" dirty="0" err="1"/>
+              <a:t>StringVar</a:t>
+            </a:r>
+            <a:r>
+              <a:rPr lang="en-US" dirty="0"/>
+              <a:t> (name)</a:t>
+            </a:r>
+          </a:p>
+          <a:p>
+            <a:r>
+              <a:rPr lang="en-US" dirty="0"/>
+              <a:t>    -&gt; Entry (</a:t>
+            </a:r>
+            <a:r>
+              <a:rPr lang="en-US" dirty="0" err="1"/>
+              <a:t>name_entry</a:t>
+            </a:r>
+            <a:r>
+              <a:rPr lang="en-US" dirty="0"/>
+              <a:t>)</a:t>
+            </a:r>
+          </a:p>
+          <a:p>
+            <a:r>
+              <a:rPr lang="en-US" dirty="0"/>
+              <a:t>    -&gt; Label (</a:t>
+            </a:r>
+            <a:r>
+              <a:rPr lang="en-US" dirty="0" err="1"/>
+              <a:t>country_lab</a:t>
+            </a:r>
+            <a:r>
+              <a:rPr lang="en-US" dirty="0"/>
+              <a:t>)</a:t>
+            </a:r>
+          </a:p>
+          <a:p>
+            <a:r>
+              <a:rPr lang="en-US" dirty="0"/>
+              <a:t>    -&gt; </a:t>
+            </a:r>
+            <a:r>
+              <a:rPr lang="en-US" dirty="0" err="1"/>
+              <a:t>StringVar</a:t>
+            </a:r>
+            <a:r>
+              <a:rPr lang="en-US" dirty="0"/>
+              <a:t> (country)</a:t>
+            </a:r>
+          </a:p>
+          <a:p>
+            <a:r>
+              <a:rPr lang="en-US" dirty="0"/>
+              <a:t>    -&gt; Entry (country _entry)</a:t>
+            </a:r>
+          </a:p>
+          <a:p>
+            <a:r>
+              <a:rPr lang="en-US" dirty="0"/>
+              <a:t>    -&gt; Label (</a:t>
+            </a:r>
+            <a:r>
+              <a:rPr lang="en-US" dirty="0" err="1"/>
+              <a:t>city_lab</a:t>
+            </a:r>
+            <a:r>
+              <a:rPr lang="en-US" dirty="0"/>
+              <a:t>)</a:t>
+            </a:r>
+          </a:p>
+          <a:p>
+            <a:r>
+              <a:rPr lang="en-US" dirty="0"/>
+              <a:t>    -&gt; </a:t>
+            </a:r>
+            <a:r>
+              <a:rPr lang="en-US" dirty="0" err="1"/>
+              <a:t>StringVar</a:t>
+            </a:r>
+            <a:r>
+              <a:rPr lang="en-US" dirty="0"/>
+              <a:t> (city)</a:t>
+            </a:r>
+          </a:p>
+          <a:p>
+            <a:r>
+              <a:rPr lang="en-US" dirty="0"/>
+              <a:t>    -&gt; Entry (city _entry)</a:t>
+            </a:r>
+          </a:p>
+          <a:p>
+            <a:r>
+              <a:rPr lang="en-US" dirty="0"/>
+              <a:t>    -&gt; Label (</a:t>
+            </a:r>
+            <a:r>
+              <a:rPr lang="en-US" dirty="0" err="1"/>
+              <a:t>address_lab</a:t>
+            </a:r>
+            <a:r>
+              <a:rPr lang="en-US" dirty="0"/>
+              <a:t>)</a:t>
+            </a:r>
+          </a:p>
+          <a:p>
+            <a:r>
+              <a:rPr lang="en-US" dirty="0"/>
+              <a:t>    -&gt; </a:t>
+            </a:r>
+            <a:r>
+              <a:rPr lang="en-US" dirty="0" err="1"/>
+              <a:t>StringVar</a:t>
+            </a:r>
+            <a:r>
+              <a:rPr lang="en-US" dirty="0"/>
+              <a:t> (address)</a:t>
+            </a:r>
+          </a:p>
+          <a:p>
+            <a:r>
+              <a:rPr lang="en-US" dirty="0"/>
+              <a:t>    -&gt; Entry (address _entry)</a:t>
+            </a:r>
+          </a:p>
+          <a:p>
+            <a:r>
+              <a:rPr lang="en-US" dirty="0"/>
+              <a:t>-&gt; Button (</a:t>
+            </a:r>
+            <a:r>
+              <a:rPr lang="en-US" dirty="0" err="1"/>
+              <a:t>add_university_button</a:t>
+            </a:r>
+            <a:r>
+              <a:rPr lang="en-US" dirty="0"/>
+              <a:t>) -&gt; </a:t>
+            </a:r>
+          </a:p>
+          <a:p>
+            <a:r>
+              <a:rPr lang="en-US" dirty="0"/>
+              <a:t>	</a:t>
+            </a:r>
+            <a:r>
+              <a:rPr lang="en-US" dirty="0" err="1"/>
+              <a:t>add_status_col</a:t>
+            </a:r>
+            <a:r>
+              <a:rPr lang="en-US" dirty="0"/>
+              <a:t>(popup, name, country,</a:t>
+            </a:r>
+          </a:p>
+          <a:p>
+            <a:r>
+              <a:rPr lang="en-US" dirty="0"/>
+              <a:t>City, address, connection, grandparent)</a:t>
+            </a:r>
+          </a:p>
+        </p:txBody>
+      </p:sp>
+      <p:sp>
+        <p:nvSpPr>
+          <p:cNvPr id="5" name="TextBox 4">
+            <a:extLst>
+              <a:ext uri="{FF2B5EF4-FFF2-40B4-BE49-F238E27FC236}">
+                <a16:creationId xmlns:a16="http://schemas.microsoft.com/office/drawing/2014/main" id="{BB44A5B3-937B-3D38-2BA6-29B4275BDD99}"/>
+              </a:ext>
+            </a:extLst>
+          </p:cNvPr>
+          <p:cNvSpPr txBox="1"/>
+          <p:nvPr/>
+        </p:nvSpPr>
+        <p:spPr>
+          <a:xfrm>
+            <a:off x="5849633" y="1690688"/>
+            <a:ext cx="5541773" cy="1754326"/>
+          </a:xfrm>
+          <a:prstGeom prst="rect">
+            <a:avLst/>
+          </a:prstGeom>
+          <a:noFill/>
+          <a:ln w="19050">
+            <a:solidFill>
+              <a:schemeClr val="tx1"/>
+            </a:solidFill>
+          </a:ln>
+        </p:spPr>
+        <p:txBody>
+          <a:bodyPr wrap="none" rtlCol="0">
+            <a:spAutoFit/>
+          </a:bodyPr>
+          <a:lstStyle/>
+          <a:p>
+            <a:r>
+              <a:rPr lang="en-US" dirty="0" err="1"/>
+              <a:t>add_user_col</a:t>
+            </a:r>
+            <a:r>
+              <a:rPr lang="en-US" dirty="0"/>
+              <a:t> (popup, name, country, city, address,</a:t>
+            </a:r>
+          </a:p>
+          <a:p>
+            <a:r>
+              <a:rPr lang="en-US" dirty="0"/>
+              <a:t>connection, grandparent)</a:t>
+            </a:r>
+          </a:p>
+          <a:p>
+            <a:r>
+              <a:rPr lang="en-US" dirty="0"/>
+              <a:t>    -&gt;  </a:t>
+            </a:r>
+            <a:r>
+              <a:rPr lang="en-US" dirty="0" err="1"/>
+              <a:t>add_row_status</a:t>
+            </a:r>
+            <a:r>
+              <a:rPr lang="en-US" dirty="0"/>
+              <a:t>(name, country, city, address,</a:t>
+            </a:r>
+          </a:p>
+          <a:p>
+            <a:r>
+              <a:rPr lang="en-US" dirty="0"/>
+              <a:t>connection)</a:t>
+            </a:r>
+          </a:p>
+          <a:p>
+            <a:r>
+              <a:rPr lang="en-US" dirty="0"/>
+              <a:t>    -&gt; </a:t>
+            </a:r>
+            <a:r>
+              <a:rPr lang="en-US" dirty="0" err="1"/>
+              <a:t>popup.destroy</a:t>
+            </a:r>
+            <a:r>
+              <a:rPr lang="en-US" dirty="0"/>
+              <a:t>()</a:t>
+            </a:r>
+          </a:p>
+          <a:p>
+            <a:r>
+              <a:rPr lang="en-US" dirty="0"/>
+              <a:t>    -&gt; </a:t>
+            </a:r>
+            <a:r>
+              <a:rPr lang="en-US" dirty="0" err="1"/>
+              <a:t>update_table</a:t>
+            </a:r>
+            <a:r>
+              <a:rPr lang="en-US"/>
+              <a:t>(‘university</a:t>
+            </a:r>
+            <a:r>
+              <a:rPr lang="en-US" dirty="0"/>
+              <a:t>’, connection, grandparent)</a:t>
+            </a:r>
+          </a:p>
+        </p:txBody>
+      </p:sp>
+    </p:spTree>
+    <p:extLst>
+      <p:ext uri="{BB962C8B-B14F-4D97-AF65-F5344CB8AC3E}">
+        <p14:creationId xmlns:p14="http://schemas.microsoft.com/office/powerpoint/2010/main" val="3097400607"/>
       </p:ext>
     </p:extLst>
   </p:cSld>

</xml_diff>

<commit_message>
WIP : add experiment tab
</commit_message>
<xml_diff>
--- a/GUI_schema.pptx
+++ b/GUI_schema.pptx
@@ -7458,12 +7458,8 @@
               <a:t>update_table</a:t>
             </a:r>
             <a:r>
-              <a:rPr lang="en-US"/>
-              <a:t>(‘laboratory’, </a:t>
-            </a:r>
-            <a:r>
-              <a:rPr lang="en-US" dirty="0"/>
-              <a:t>connection, grandparent)</a:t>
+              <a:rPr lang="en-US" dirty="0"/>
+              <a:t>(‘laboratory’, connection, grandparent)</a:t>
             </a:r>
           </a:p>
         </p:txBody>

</xml_diff>